<commit_message>
fixed a single typo on slide 9
</commit_message>
<xml_diff>
--- a/GABB17/GABB17.pptx
+++ b/GABB17/GABB17.pptx
@@ -214,7 +214,7 @@
           <a:p>
             <a:fld id="{97925B09-63AB-4C91-8A99-2148043AC93D}" type="datetimeFigureOut">
               <a:rPr lang="en-US" smtClean="0"/>
-              <a:t>05/29/2017</a:t>
+              <a:t>5/29/17</a:t>
             </a:fld>
             <a:endParaRPr lang="en-US"/>
           </a:p>
@@ -1472,7 +1472,7 @@
           <a:p>
             <a:fld id="{595D5793-CDDF-481D-A0D1-67F630DA1EF7}" type="datetime1">
               <a:rPr lang="en-US" smtClean="0"/>
-              <a:t>05/29/2017</a:t>
+              <a:t>5/29/17</a:t>
             </a:fld>
             <a:endParaRPr lang="en-US"/>
           </a:p>
@@ -1642,7 +1642,7 @@
           <a:p>
             <a:fld id="{A85B57D8-594B-401D-8570-452706A84A37}" type="datetime1">
               <a:rPr lang="en-US" smtClean="0"/>
-              <a:t>05/29/2017</a:t>
+              <a:t>5/29/17</a:t>
             </a:fld>
             <a:endParaRPr lang="en-US"/>
           </a:p>
@@ -1822,7 +1822,7 @@
           <a:p>
             <a:fld id="{B3F71434-8881-47C0-9233-C3C17BDD4C40}" type="datetime1">
               <a:rPr lang="en-US" smtClean="0"/>
-              <a:t>05/29/2017</a:t>
+              <a:t>5/29/17</a:t>
             </a:fld>
             <a:endParaRPr lang="en-US"/>
           </a:p>
@@ -2012,7 +2012,7 @@
           <a:p>
             <a:fld id="{9982CBF4-8656-4EE3-A407-9ABB990646D3}" type="datetime1">
               <a:rPr lang="en-US" smtClean="0"/>
-              <a:t>05/29/2017</a:t>
+              <a:t>5/29/17</a:t>
             </a:fld>
             <a:endParaRPr lang="en-US"/>
           </a:p>
@@ -2288,7 +2288,7 @@
           <a:p>
             <a:fld id="{336140F5-622A-49F4-845E-4E7B37C32FD3}" type="datetime1">
               <a:rPr lang="en-US" smtClean="0"/>
-              <a:t>05/29/2017</a:t>
+              <a:t>5/29/17</a:t>
             </a:fld>
             <a:endParaRPr lang="en-US"/>
           </a:p>
@@ -2520,7 +2520,7 @@
           <a:p>
             <a:fld id="{845B74C3-687D-43E3-B134-D1D6D077C4CB}" type="datetime1">
               <a:rPr lang="en-US" smtClean="0"/>
-              <a:t>05/29/2017</a:t>
+              <a:t>5/29/17</a:t>
             </a:fld>
             <a:endParaRPr lang="en-US"/>
           </a:p>
@@ -2887,7 +2887,7 @@
           <a:p>
             <a:fld id="{01BF3D81-1B11-41E4-B9B2-B3E5E85C1486}" type="datetime1">
               <a:rPr lang="en-US" smtClean="0"/>
-              <a:t>05/29/2017</a:t>
+              <a:t>5/29/17</a:t>
             </a:fld>
             <a:endParaRPr lang="en-US"/>
           </a:p>
@@ -3005,7 +3005,7 @@
           <a:p>
             <a:fld id="{55EDA3DB-ED38-425A-B436-2D61148B6D5B}" type="datetime1">
               <a:rPr lang="en-US" smtClean="0"/>
-              <a:t>05/29/2017</a:t>
+              <a:t>5/29/17</a:t>
             </a:fld>
             <a:endParaRPr lang="en-US"/>
           </a:p>
@@ -3100,7 +3100,7 @@
           <a:p>
             <a:fld id="{687BD668-A2D8-4AB6-8914-8359AB40AC0E}" type="datetime1">
               <a:rPr lang="en-US" smtClean="0"/>
-              <a:t>05/29/2017</a:t>
+              <a:t>5/29/17</a:t>
             </a:fld>
             <a:endParaRPr lang="en-US"/>
           </a:p>
@@ -3377,7 +3377,7 @@
           <a:p>
             <a:fld id="{0C4334F7-5B54-4B7B-B933-4013F71FC0BD}" type="datetime1">
               <a:rPr lang="en-US" smtClean="0"/>
-              <a:t>05/29/2017</a:t>
+              <a:t>5/29/17</a:t>
             </a:fld>
             <a:endParaRPr lang="en-US"/>
           </a:p>
@@ -3630,7 +3630,7 @@
           <a:p>
             <a:fld id="{B6168B50-75C0-46FD-8422-608845C19915}" type="datetime1">
               <a:rPr lang="en-US" smtClean="0"/>
-              <a:t>05/29/2017</a:t>
+              <a:t>5/29/17</a:t>
             </a:fld>
             <a:endParaRPr lang="en-US"/>
           </a:p>
@@ -3843,7 +3843,7 @@
           <a:p>
             <a:fld id="{0D0122F6-BBAD-4DD2-8758-8AA0038B61E1}" type="datetime1">
               <a:rPr lang="en-US" smtClean="0"/>
-              <a:t>05/29/2017</a:t>
+              <a:t>5/29/17</a:t>
             </a:fld>
             <a:endParaRPr lang="en-US"/>
           </a:p>
@@ -11971,7 +11971,7 @@
                         <m:endChr m:val="⟩"/>
                         <m:ctrlPr>
                           <a:rPr lang="en-US" i="1" smtClean="0">
-                            <a:latin typeface="Cambria Math" panose="02040503050406030204" pitchFamily="18" charset="0"/>
+                            <a:latin typeface="Cambria Math" charset="0"/>
                           </a:rPr>
                         </m:ctrlPr>
                       </m:dPr>
@@ -12515,8 +12515,8 @@
           </a:p>
         </p:txBody>
       </p:sp>
-      <mc:AlternateContent xmlns:mc="http://schemas.openxmlformats.org/markup-compatibility/2006" xmlns:a14="http://schemas.microsoft.com/office/drawing/2010/main">
-        <mc:Choice Requires="a14">
+      <mc:AlternateContent xmlns:mc="http://schemas.openxmlformats.org/markup-compatibility/2006">
+        <mc:Choice xmlns:a14="http://schemas.microsoft.com/office/drawing/2010/main" Requires="a14">
           <p:sp>
             <p:nvSpPr>
               <p:cNvPr id="3" name="Content Placeholder 2"/>
@@ -12544,7 +12544,7 @@
                         <m:endChr m:val="⟩"/>
                         <m:ctrlPr>
                           <a:rPr lang="en-US" i="1" smtClean="0">
-                            <a:latin typeface="Cambria Math" panose="02040503050406030204" pitchFamily="18" charset="0"/>
+                            <a:latin typeface="Cambria Math" charset="0"/>
                           </a:rPr>
                         </m:ctrlPr>
                       </m:dPr>
@@ -12553,7 +12553,7 @@
                           <m:sSubPr>
                             <m:ctrlPr>
                               <a:rPr lang="en-US" i="1" smtClean="0">
-                                <a:latin typeface="Cambria Math" panose="02040503050406030204" pitchFamily="18" charset="0"/>
+                                <a:latin typeface="Cambria Math" charset="0"/>
                               </a:rPr>
                             </m:ctrlPr>
                           </m:sSubPr>
@@ -12584,7 +12584,7 @@
                           <m:sSubPr>
                             <m:ctrlPr>
                               <a:rPr lang="en-US" b="0" i="1" smtClean="0">
-                                <a:latin typeface="Cambria Math" panose="02040503050406030204" pitchFamily="18" charset="0"/>
+                                <a:latin typeface="Cambria Math" charset="0"/>
                               </a:rPr>
                             </m:ctrlPr>
                           </m:sSubPr>
@@ -12627,7 +12627,7 @@
                           <m:sSubPr>
                             <m:ctrlPr>
                               <a:rPr lang="en-US" b="0" i="1" smtClean="0">
-                                <a:latin typeface="Cambria Math" panose="02040503050406030204" pitchFamily="18" charset="0"/>
+                                <a:latin typeface="Cambria Math" charset="0"/>
                               </a:rPr>
                             </m:ctrlPr>
                           </m:sSubPr>
@@ -12659,7 +12659,7 @@
                           <m:sSubPr>
                             <m:ctrlPr>
                               <a:rPr lang="en-US" b="0" i="1" smtClean="0">
-                                <a:latin typeface="Cambria Math" panose="02040503050406030204" pitchFamily="18" charset="0"/>
+                                <a:latin typeface="Cambria Math" charset="0"/>
                                 <a:ea typeface="Cambria Math" panose="02040503050406030204" pitchFamily="18" charset="0"/>
                               </a:rPr>
                             </m:ctrlPr>
@@ -12702,7 +12702,7 @@
                         <m:endChr m:val="⟩"/>
                         <m:ctrlPr>
                           <a:rPr lang="en-US" i="1">
-                            <a:latin typeface="Cambria Math" panose="02040503050406030204" pitchFamily="18" charset="0"/>
+                            <a:latin typeface="Cambria Math" charset="0"/>
                           </a:rPr>
                         </m:ctrlPr>
                       </m:dPr>
@@ -12711,7 +12711,7 @@
                           <m:sSubPr>
                             <m:ctrlPr>
                               <a:rPr lang="en-US" i="1">
-                                <a:latin typeface="Cambria Math" panose="02040503050406030204" pitchFamily="18" charset="0"/>
+                                <a:latin typeface="Cambria Math" charset="0"/>
                               </a:rPr>
                             </m:ctrlPr>
                           </m:sSubPr>
@@ -12742,7 +12742,7 @@
                           <m:sSubPr>
                             <m:ctrlPr>
                               <a:rPr lang="en-US" i="1">
-                                <a:latin typeface="Cambria Math" panose="02040503050406030204" pitchFamily="18" charset="0"/>
+                                <a:latin typeface="Cambria Math" charset="0"/>
                               </a:rPr>
                             </m:ctrlPr>
                           </m:sSubPr>
@@ -12773,7 +12773,7 @@
                           <m:sSubPr>
                             <m:ctrlPr>
                               <a:rPr lang="en-US" i="1" smtClean="0">
-                                <a:latin typeface="Cambria Math" panose="02040503050406030204" pitchFamily="18" charset="0"/>
+                                <a:latin typeface="Cambria Math" charset="0"/>
                               </a:rPr>
                             </m:ctrlPr>
                           </m:sSubPr>
@@ -12817,7 +12817,7 @@
                           <m:sSubPr>
                             <m:ctrlPr>
                               <a:rPr lang="en-US" i="1">
-                                <a:latin typeface="Cambria Math" panose="02040503050406030204" pitchFamily="18" charset="0"/>
+                                <a:latin typeface="Cambria Math" charset="0"/>
                               </a:rPr>
                             </m:ctrlPr>
                           </m:sSubPr>
@@ -12849,7 +12849,7 @@
                           <m:sSubPr>
                             <m:ctrlPr>
                               <a:rPr lang="en-US" i="1">
-                                <a:latin typeface="Cambria Math" panose="02040503050406030204" pitchFamily="18" charset="0"/>
+                                <a:latin typeface="Cambria Math" charset="0"/>
                                 <a:ea typeface="Cambria Math" panose="02040503050406030204" pitchFamily="18" charset="0"/>
                               </a:rPr>
                             </m:ctrlPr>
@@ -12884,7 +12884,7 @@
                           <m:sSubPr>
                             <m:ctrlPr>
                               <a:rPr lang="en-US" i="1" smtClean="0">
-                                <a:latin typeface="Cambria Math" panose="02040503050406030204" pitchFamily="18" charset="0"/>
+                                <a:latin typeface="Cambria Math" charset="0"/>
                                 <a:ea typeface="Cambria Math" panose="02040503050406030204" pitchFamily="18" charset="0"/>
                               </a:rPr>
                             </m:ctrlPr>
@@ -12927,7 +12927,7 @@
                         <m:endChr m:val="⟩"/>
                         <m:ctrlPr>
                           <a:rPr lang="en-US" i="1" smtClean="0">
-                            <a:latin typeface="Cambria Math" panose="02040503050406030204" pitchFamily="18" charset="0"/>
+                            <a:latin typeface="Cambria Math" charset="0"/>
                           </a:rPr>
                         </m:ctrlPr>
                       </m:dPr>
@@ -13009,7 +13009,7 @@
                         <m:endChr m:val="⟩"/>
                         <m:ctrlPr>
                           <a:rPr lang="en-US" i="1" smtClean="0">
-                            <a:latin typeface="Cambria Math" panose="02040503050406030204" pitchFamily="18" charset="0"/>
+                            <a:latin typeface="Cambria Math" charset="0"/>
                           </a:rPr>
                         </m:ctrlPr>
                       </m:dPr>
@@ -13018,7 +13018,7 @@
                           <m:sSubPr>
                             <m:ctrlPr>
                               <a:rPr lang="en-US" i="1" smtClean="0">
-                                <a:latin typeface="Cambria Math" panose="02040503050406030204" pitchFamily="18" charset="0"/>
+                                <a:latin typeface="Cambria Math" charset="0"/>
                               </a:rPr>
                             </m:ctrlPr>
                           </m:sSubPr>
@@ -13049,7 +13049,7 @@
                           <m:sSubPr>
                             <m:ctrlPr>
                               <a:rPr lang="en-US" b="0" i="1" smtClean="0">
-                                <a:latin typeface="Cambria Math" panose="02040503050406030204" pitchFamily="18" charset="0"/>
+                                <a:latin typeface="Cambria Math" charset="0"/>
                               </a:rPr>
                             </m:ctrlPr>
                           </m:sSubPr>
@@ -13080,7 +13080,7 @@
                           <m:sSubPr>
                             <m:ctrlPr>
                               <a:rPr lang="en-US" b="0" i="1" smtClean="0">
-                                <a:latin typeface="Cambria Math" panose="02040503050406030204" pitchFamily="18" charset="0"/>
+                                <a:latin typeface="Cambria Math" charset="0"/>
                               </a:rPr>
                             </m:ctrlPr>
                           </m:sSubPr>
@@ -13118,7 +13118,7 @@
                           <m:sSubPr>
                             <m:ctrlPr>
                               <a:rPr lang="en-US" b="0" i="1" smtClean="0">
-                                <a:latin typeface="Cambria Math" panose="02040503050406030204" pitchFamily="18" charset="0"/>
+                                <a:latin typeface="Cambria Math" charset="0"/>
                                 <a:ea typeface="Cambria Math" panose="02040503050406030204" pitchFamily="18" charset="0"/>
                               </a:rPr>
                             </m:ctrlPr>
@@ -13153,7 +13153,7 @@
                           <m:sSubPr>
                             <m:ctrlPr>
                               <a:rPr lang="en-US" b="0" i="1" smtClean="0">
-                                <a:latin typeface="Cambria Math" panose="02040503050406030204" pitchFamily="18" charset="0"/>
+                                <a:latin typeface="Cambria Math" charset="0"/>
                                 <a:ea typeface="Cambria Math" panose="02040503050406030204" pitchFamily="18" charset="0"/>
                               </a:rPr>
                             </m:ctrlPr>
@@ -13188,7 +13188,7 @@
                           <m:sSubPr>
                             <m:ctrlPr>
                               <a:rPr lang="en-US" b="0" i="1" smtClean="0">
-                                <a:latin typeface="Cambria Math" panose="02040503050406030204" pitchFamily="18" charset="0"/>
+                                <a:latin typeface="Cambria Math" charset="0"/>
                                 <a:ea typeface="Cambria Math" panose="02040503050406030204" pitchFamily="18" charset="0"/>
                               </a:rPr>
                             </m:ctrlPr>
@@ -13223,7 +13223,7 @@
                           <m:sSubPr>
                             <m:ctrlPr>
                               <a:rPr lang="en-US" b="0" i="1" smtClean="0">
-                                <a:latin typeface="Cambria Math" panose="02040503050406030204" pitchFamily="18" charset="0"/>
+                                <a:latin typeface="Cambria Math" charset="0"/>
                                 <a:ea typeface="Cambria Math" panose="02040503050406030204" pitchFamily="18" charset="0"/>
                               </a:rPr>
                             </m:ctrlPr>
@@ -13249,16 +13249,16 @@
                         </m:sSub>
                         <m:r>
                           <a:rPr lang="en-US" b="0" i="1" smtClean="0">
-                            <a:latin typeface="Cambria Math" panose="02040503050406030204" pitchFamily="18" charset="0"/>
+                            <a:latin typeface="Cambria Math" charset="0"/>
                             <a:ea typeface="Cambria Math" panose="02040503050406030204" pitchFamily="18" charset="0"/>
                           </a:rPr>
-                          <m:t>×</m:t>
+                          <m:t>+</m:t>
                         </m:r>
                         <m:sSub>
                           <m:sSubPr>
                             <m:ctrlPr>
                               <a:rPr lang="en-US" b="0" i="1" smtClean="0">
-                                <a:latin typeface="Cambria Math" panose="02040503050406030204" pitchFamily="18" charset="0"/>
+                                <a:latin typeface="Cambria Math" charset="0"/>
                                 <a:ea typeface="Cambria Math" panose="02040503050406030204" pitchFamily="18" charset="0"/>
                               </a:rPr>
                             </m:ctrlPr>
@@ -13293,7 +13293,7 @@
                           <m:sSubPr>
                             <m:ctrlPr>
                               <a:rPr lang="en-US" b="0" i="1" smtClean="0">
-                                <a:latin typeface="Cambria Math" panose="02040503050406030204" pitchFamily="18" charset="0"/>
+                                <a:latin typeface="Cambria Math" charset="0"/>
                                 <a:ea typeface="Cambria Math" panose="02040503050406030204" pitchFamily="18" charset="0"/>
                               </a:rPr>
                             </m:ctrlPr>
@@ -13343,7 +13343,7 @@
                         <m:endChr m:val="⟩"/>
                         <m:ctrlPr>
                           <a:rPr lang="en-US" i="1" smtClean="0">
-                            <a:latin typeface="Cambria Math" panose="02040503050406030204" pitchFamily="18" charset="0"/>
+                            <a:latin typeface="Cambria Math" charset="0"/>
                           </a:rPr>
                         </m:ctrlPr>
                       </m:dPr>
@@ -13378,7 +13378,7 @@
                             <m:endChr m:val="}"/>
                             <m:ctrlPr>
                               <a:rPr lang="en-US" b="0" i="1" smtClean="0">
-                                <a:latin typeface="Cambria Math" panose="02040503050406030204" pitchFamily="18" charset="0"/>
+                                <a:latin typeface="Cambria Math" charset="0"/>
                               </a:rPr>
                             </m:ctrlPr>
                           </m:dPr>
@@ -13387,7 +13387,7 @@
                               <m:dPr>
                                 <m:ctrlPr>
                                   <a:rPr lang="en-US" b="0" i="1" smtClean="0">
-                                    <a:latin typeface="Cambria Math" panose="02040503050406030204" pitchFamily="18" charset="0"/>
+                                    <a:latin typeface="Cambria Math" charset="0"/>
                                   </a:rPr>
                                 </m:ctrlPr>
                               </m:dPr>
@@ -13408,7 +13408,7 @@
                                   <m:sSubPr>
                                     <m:ctrlPr>
                                       <a:rPr lang="en-US" b="0" i="1" smtClean="0">
-                                        <a:latin typeface="Cambria Math" panose="02040503050406030204" pitchFamily="18" charset="0"/>
+                                        <a:latin typeface="Cambria Math" charset="0"/>
                                       </a:rPr>
                                     </m:ctrlPr>
                                   </m:sSubPr>
@@ -13452,7 +13452,7 @@
                         <m:endChr m:val="⟩"/>
                         <m:ctrlPr>
                           <a:rPr lang="en-US" i="1" smtClean="0">
-                            <a:latin typeface="Cambria Math" panose="02040503050406030204" pitchFamily="18" charset="0"/>
+                            <a:latin typeface="Cambria Math" charset="0"/>
                           </a:rPr>
                         </m:ctrlPr>
                       </m:dPr>
@@ -13499,7 +13499,7 @@
                             <m:endChr m:val="}"/>
                             <m:ctrlPr>
                               <a:rPr lang="en-US" b="0" i="1" smtClean="0">
-                                <a:latin typeface="Cambria Math" panose="02040503050406030204" pitchFamily="18" charset="0"/>
+                                <a:latin typeface="Cambria Math" charset="0"/>
                               </a:rPr>
                             </m:ctrlPr>
                           </m:dPr>
@@ -13508,7 +13508,7 @@
                               <m:dPr>
                                 <m:ctrlPr>
                                   <a:rPr lang="en-US" b="0" i="1" smtClean="0">
-                                    <a:latin typeface="Cambria Math" panose="02040503050406030204" pitchFamily="18" charset="0"/>
+                                    <a:latin typeface="Cambria Math" charset="0"/>
                                   </a:rPr>
                                 </m:ctrlPr>
                               </m:dPr>
@@ -13541,7 +13541,7 @@
                                   <m:sSubPr>
                                     <m:ctrlPr>
                                       <a:rPr lang="en-US" b="0" i="1" smtClean="0">
-                                        <a:latin typeface="Cambria Math" panose="02040503050406030204" pitchFamily="18" charset="0"/>
+                                        <a:latin typeface="Cambria Math" charset="0"/>
                                       </a:rPr>
                                     </m:ctrlPr>
                                   </m:sSubPr>
@@ -13585,7 +13585,7 @@
                         <m:endChr m:val="}"/>
                         <m:ctrlPr>
                           <a:rPr lang="en-US" i="1" smtClean="0">
-                            <a:latin typeface="Cambria Math" panose="02040503050406030204" pitchFamily="18" charset="0"/>
+                            <a:latin typeface="Cambria Math" charset="0"/>
                           </a:rPr>
                         </m:ctrlPr>
                       </m:dPr>
@@ -13594,7 +13594,7 @@
                           <m:dPr>
                             <m:ctrlPr>
                               <a:rPr lang="en-US" i="1" smtClean="0">
-                                <a:latin typeface="Cambria Math" panose="02040503050406030204" pitchFamily="18" charset="0"/>
+                                <a:latin typeface="Cambria Math" charset="0"/>
                               </a:rPr>
                             </m:ctrlPr>
                           </m:dPr>
@@ -13628,7 +13628,7 @@
             </p:txBody>
           </p:sp>
         </mc:Choice>
-        <mc:Fallback xmlns="">
+        <mc:Fallback>
           <p:sp>
             <p:nvSpPr>
               <p:cNvPr id="3" name="Content Placeholder 2"/>
@@ -19238,7 +19238,7 @@
           </a:ln>
           <a:extLst>
             <a:ext uri="{909E8E84-426E-40dd-AFC4-6F175D3DCCD1}">
-              <a14:hiddenFill xmlns="" xmlns:a14="http://schemas.microsoft.com/office/drawing/2010/main">
+              <a14:hiddenFill xmlns:a14="http://schemas.microsoft.com/office/drawing/2010/main" xmlns="">
                 <a:solidFill>
                   <a:srgbClr val="FFFFFF"/>
                 </a:solidFill>
@@ -19292,14 +19292,14 @@
           </a:ln>
           <a:extLst>
             <a:ext uri="{909E8E84-426E-40dd-AFC4-6F175D3DCCD1}">
-              <a14:hiddenFill xmlns="" xmlns:a14="http://schemas.microsoft.com/office/drawing/2010/main">
+              <a14:hiddenFill xmlns:a14="http://schemas.microsoft.com/office/drawing/2010/main" xmlns="">
                 <a:solidFill>
                   <a:srgbClr val="FFFFFF"/>
                 </a:solidFill>
               </a14:hiddenFill>
             </a:ext>
             <a:ext uri="{91240B29-F687-4f45-9708-019B960494DF}">
-              <a14:hiddenLine xmlns="" xmlns:a14="http://schemas.microsoft.com/office/drawing/2010/main" w="12700">
+              <a14:hiddenLine xmlns:a14="http://schemas.microsoft.com/office/drawing/2010/main" xmlns="" w="12700">
                 <a:solidFill>
                   <a:srgbClr val="000000"/>
                 </a:solidFill>
@@ -19484,14 +19484,14 @@
             </a:ln>
             <a:extLst>
               <a:ext uri="{909E8E84-426E-40dd-AFC4-6F175D3DCCD1}">
-                <a14:hiddenFill xmlns="" xmlns:a14="http://schemas.microsoft.com/office/drawing/2010/main">
+                <a14:hiddenFill xmlns:a14="http://schemas.microsoft.com/office/drawing/2010/main" xmlns="">
                   <a:solidFill>
                     <a:srgbClr val="FFFFFF"/>
                   </a:solidFill>
                 </a14:hiddenFill>
               </a:ext>
               <a:ext uri="{91240B29-F687-4f45-9708-019B960494DF}">
-                <a14:hiddenLine xmlns="" xmlns:a14="http://schemas.microsoft.com/office/drawing/2010/main" w="12700">
+                <a14:hiddenLine xmlns:a14="http://schemas.microsoft.com/office/drawing/2010/main" xmlns="" w="12700">
                   <a:solidFill>
                     <a:srgbClr val="000000"/>
                   </a:solidFill>
@@ -19548,14 +19548,14 @@
             </a:ln>
             <a:extLst>
               <a:ext uri="{909E8E84-426E-40dd-AFC4-6F175D3DCCD1}">
-                <a14:hiddenFill xmlns="" xmlns:a14="http://schemas.microsoft.com/office/drawing/2010/main">
+                <a14:hiddenFill xmlns:a14="http://schemas.microsoft.com/office/drawing/2010/main" xmlns="">
                   <a:solidFill>
                     <a:srgbClr val="FFFFFF"/>
                   </a:solidFill>
                 </a14:hiddenFill>
               </a:ext>
               <a:ext uri="{91240B29-F687-4f45-9708-019B960494DF}">
-                <a14:hiddenLine xmlns="" xmlns:a14="http://schemas.microsoft.com/office/drawing/2010/main" w="12700">
+                <a14:hiddenLine xmlns:a14="http://schemas.microsoft.com/office/drawing/2010/main" xmlns="" w="12700">
                   <a:solidFill>
                     <a:srgbClr val="000000"/>
                   </a:solidFill>
@@ -19612,14 +19612,14 @@
             </a:ln>
             <a:extLst>
               <a:ext uri="{909E8E84-426E-40dd-AFC4-6F175D3DCCD1}">
-                <a14:hiddenFill xmlns="" xmlns:a14="http://schemas.microsoft.com/office/drawing/2010/main">
+                <a14:hiddenFill xmlns:a14="http://schemas.microsoft.com/office/drawing/2010/main" xmlns="">
                   <a:solidFill>
                     <a:srgbClr val="FFFFFF"/>
                   </a:solidFill>
                 </a14:hiddenFill>
               </a:ext>
               <a:ext uri="{91240B29-F687-4f45-9708-019B960494DF}">
-                <a14:hiddenLine xmlns="" xmlns:a14="http://schemas.microsoft.com/office/drawing/2010/main" w="12700">
+                <a14:hiddenLine xmlns:a14="http://schemas.microsoft.com/office/drawing/2010/main" xmlns="" w="12700">
                   <a:solidFill>
                     <a:srgbClr val="000000"/>
                   </a:solidFill>
@@ -19676,14 +19676,14 @@
             </a:ln>
             <a:extLst>
               <a:ext uri="{909E8E84-426E-40dd-AFC4-6F175D3DCCD1}">
-                <a14:hiddenFill xmlns="" xmlns:a14="http://schemas.microsoft.com/office/drawing/2010/main">
+                <a14:hiddenFill xmlns:a14="http://schemas.microsoft.com/office/drawing/2010/main" xmlns="">
                   <a:solidFill>
                     <a:srgbClr val="FFFFFF"/>
                   </a:solidFill>
                 </a14:hiddenFill>
               </a:ext>
               <a:ext uri="{91240B29-F687-4f45-9708-019B960494DF}">
-                <a14:hiddenLine xmlns="" xmlns:a14="http://schemas.microsoft.com/office/drawing/2010/main" w="12700">
+                <a14:hiddenLine xmlns:a14="http://schemas.microsoft.com/office/drawing/2010/main" xmlns="" w="12700">
                   <a:solidFill>
                     <a:srgbClr val="000000"/>
                   </a:solidFill>
@@ -19742,7 +19742,7 @@
             </a:ln>
             <a:extLst>
               <a:ext uri="{91240B29-F687-4f45-9708-019B960494DF}">
-                <a14:hiddenLine xmlns="" xmlns:a14="http://schemas.microsoft.com/office/drawing/2010/main" w="12700">
+                <a14:hiddenLine xmlns:a14="http://schemas.microsoft.com/office/drawing/2010/main" xmlns="" w="12700">
                   <a:solidFill>
                     <a:srgbClr val="000000"/>
                   </a:solidFill>
@@ -19799,14 +19799,14 @@
             </a:ln>
             <a:extLst>
               <a:ext uri="{909E8E84-426E-40dd-AFC4-6F175D3DCCD1}">
-                <a14:hiddenFill xmlns="" xmlns:a14="http://schemas.microsoft.com/office/drawing/2010/main">
+                <a14:hiddenFill xmlns:a14="http://schemas.microsoft.com/office/drawing/2010/main" xmlns="">
                   <a:solidFill>
                     <a:srgbClr val="FFFFFF"/>
                   </a:solidFill>
                 </a14:hiddenFill>
               </a:ext>
               <a:ext uri="{91240B29-F687-4f45-9708-019B960494DF}">
-                <a14:hiddenLine xmlns="" xmlns:a14="http://schemas.microsoft.com/office/drawing/2010/main" w="12700">
+                <a14:hiddenLine xmlns:a14="http://schemas.microsoft.com/office/drawing/2010/main" xmlns="" w="12700">
                   <a:solidFill>
                     <a:srgbClr val="000000"/>
                   </a:solidFill>
@@ -19863,14 +19863,14 @@
             </a:ln>
             <a:extLst>
               <a:ext uri="{909E8E84-426E-40dd-AFC4-6F175D3DCCD1}">
-                <a14:hiddenFill xmlns="" xmlns:a14="http://schemas.microsoft.com/office/drawing/2010/main">
+                <a14:hiddenFill xmlns:a14="http://schemas.microsoft.com/office/drawing/2010/main" xmlns="">
                   <a:solidFill>
                     <a:srgbClr val="FFFFFF"/>
                   </a:solidFill>
                 </a14:hiddenFill>
               </a:ext>
               <a:ext uri="{91240B29-F687-4f45-9708-019B960494DF}">
-                <a14:hiddenLine xmlns="" xmlns:a14="http://schemas.microsoft.com/office/drawing/2010/main" w="12700">
+                <a14:hiddenLine xmlns:a14="http://schemas.microsoft.com/office/drawing/2010/main" xmlns="" w="12700">
                   <a:solidFill>
                     <a:srgbClr val="000000"/>
                   </a:solidFill>
@@ -19942,14 +19942,14 @@
             </a:ln>
             <a:extLst>
               <a:ext uri="{909E8E84-426E-40dd-AFC4-6F175D3DCCD1}">
-                <a14:hiddenFill xmlns="" xmlns:a14="http://schemas.microsoft.com/office/drawing/2010/main">
+                <a14:hiddenFill xmlns:a14="http://schemas.microsoft.com/office/drawing/2010/main" xmlns="">
                   <a:solidFill>
                     <a:srgbClr val="FFFFFF"/>
                   </a:solidFill>
                 </a14:hiddenFill>
               </a:ext>
               <a:ext uri="{91240B29-F687-4f45-9708-019B960494DF}">
-                <a14:hiddenLine xmlns="" xmlns:a14="http://schemas.microsoft.com/office/drawing/2010/main" w="12700">
+                <a14:hiddenLine xmlns:a14="http://schemas.microsoft.com/office/drawing/2010/main" xmlns="" w="12700">
                   <a:solidFill>
                     <a:srgbClr val="000000"/>
                   </a:solidFill>
@@ -20011,7 +20011,7 @@
             </a:ln>
             <a:extLst>
               <a:ext uri="{909E8E84-426E-40dd-AFC4-6F175D3DCCD1}">
-                <a14:hiddenFill xmlns="" xmlns:a14="http://schemas.microsoft.com/office/drawing/2010/main">
+                <a14:hiddenFill xmlns:a14="http://schemas.microsoft.com/office/drawing/2010/main" xmlns="">
                   <a:solidFill>
                     <a:srgbClr val="FFFFFF"/>
                   </a:solidFill>
@@ -20065,14 +20065,14 @@
             </a:ln>
             <a:extLst>
               <a:ext uri="{909E8E84-426E-40dd-AFC4-6F175D3DCCD1}">
-                <a14:hiddenFill xmlns="" xmlns:a14="http://schemas.microsoft.com/office/drawing/2010/main">
+                <a14:hiddenFill xmlns:a14="http://schemas.microsoft.com/office/drawing/2010/main" xmlns="">
                   <a:solidFill>
                     <a:srgbClr val="FFFFFF"/>
                   </a:solidFill>
                 </a14:hiddenFill>
               </a:ext>
               <a:ext uri="{91240B29-F687-4f45-9708-019B960494DF}">
-                <a14:hiddenLine xmlns="" xmlns:a14="http://schemas.microsoft.com/office/drawing/2010/main" w="12700">
+                <a14:hiddenLine xmlns:a14="http://schemas.microsoft.com/office/drawing/2010/main" xmlns="" w="12700">
                   <a:solidFill>
                     <a:srgbClr val="000000"/>
                   </a:solidFill>
@@ -20129,14 +20129,14 @@
             </a:ln>
             <a:extLst>
               <a:ext uri="{909E8E84-426E-40dd-AFC4-6F175D3DCCD1}">
-                <a14:hiddenFill xmlns="" xmlns:a14="http://schemas.microsoft.com/office/drawing/2010/main">
+                <a14:hiddenFill xmlns:a14="http://schemas.microsoft.com/office/drawing/2010/main" xmlns="">
                   <a:solidFill>
                     <a:srgbClr val="FFFFFF"/>
                   </a:solidFill>
                 </a14:hiddenFill>
               </a:ext>
               <a:ext uri="{91240B29-F687-4f45-9708-019B960494DF}">
-                <a14:hiddenLine xmlns="" xmlns:a14="http://schemas.microsoft.com/office/drawing/2010/main" w="12700">
+                <a14:hiddenLine xmlns:a14="http://schemas.microsoft.com/office/drawing/2010/main" xmlns="" w="12700">
                   <a:solidFill>
                     <a:srgbClr val="000000"/>
                   </a:solidFill>
@@ -20195,7 +20195,7 @@
             </a:ln>
             <a:extLst>
               <a:ext uri="{91240B29-F687-4f45-9708-019B960494DF}">
-                <a14:hiddenLine xmlns="" xmlns:a14="http://schemas.microsoft.com/office/drawing/2010/main" w="12700">
+                <a14:hiddenLine xmlns:a14="http://schemas.microsoft.com/office/drawing/2010/main" xmlns="" w="12700">
                   <a:solidFill>
                     <a:srgbClr val="000000"/>
                   </a:solidFill>
@@ -20252,14 +20252,14 @@
             </a:ln>
             <a:extLst>
               <a:ext uri="{909E8E84-426E-40dd-AFC4-6F175D3DCCD1}">
-                <a14:hiddenFill xmlns="" xmlns:a14="http://schemas.microsoft.com/office/drawing/2010/main">
+                <a14:hiddenFill xmlns:a14="http://schemas.microsoft.com/office/drawing/2010/main" xmlns="">
                   <a:solidFill>
                     <a:srgbClr val="FFFFFF"/>
                   </a:solidFill>
                 </a14:hiddenFill>
               </a:ext>
               <a:ext uri="{91240B29-F687-4f45-9708-019B960494DF}">
-                <a14:hiddenLine xmlns="" xmlns:a14="http://schemas.microsoft.com/office/drawing/2010/main" w="12700">
+                <a14:hiddenLine xmlns:a14="http://schemas.microsoft.com/office/drawing/2010/main" xmlns="" w="12700">
                   <a:solidFill>
                     <a:srgbClr val="000000"/>
                   </a:solidFill>
@@ -20318,7 +20318,7 @@
             </a:ln>
             <a:extLst>
               <a:ext uri="{91240B29-F687-4f45-9708-019B960494DF}">
-                <a14:hiddenLine xmlns="" xmlns:a14="http://schemas.microsoft.com/office/drawing/2010/main" w="12700">
+                <a14:hiddenLine xmlns:a14="http://schemas.microsoft.com/office/drawing/2010/main" xmlns="" w="12700">
                   <a:solidFill>
                     <a:srgbClr val="000000"/>
                   </a:solidFill>
@@ -20423,14 +20423,14 @@
             </a:ln>
             <a:extLst>
               <a:ext uri="{909E8E84-426E-40dd-AFC4-6F175D3DCCD1}">
-                <a14:hiddenFill xmlns="" xmlns:a14="http://schemas.microsoft.com/office/drawing/2010/main">
+                <a14:hiddenFill xmlns:a14="http://schemas.microsoft.com/office/drawing/2010/main" xmlns="">
                   <a:solidFill>
                     <a:srgbClr val="FFFFFF"/>
                   </a:solidFill>
                 </a14:hiddenFill>
               </a:ext>
               <a:ext uri="{91240B29-F687-4f45-9708-019B960494DF}">
-                <a14:hiddenLine xmlns="" xmlns:a14="http://schemas.microsoft.com/office/drawing/2010/main" w="12700">
+                <a14:hiddenLine xmlns:a14="http://schemas.microsoft.com/office/drawing/2010/main" xmlns="" w="12700">
                   <a:solidFill>
                     <a:srgbClr val="000000"/>
                   </a:solidFill>
@@ -20533,14 +20533,14 @@
             </a:ln>
             <a:extLst>
               <a:ext uri="{909E8E84-426E-40dd-AFC4-6F175D3DCCD1}">
-                <a14:hiddenFill xmlns="" xmlns:a14="http://schemas.microsoft.com/office/drawing/2010/main">
+                <a14:hiddenFill xmlns:a14="http://schemas.microsoft.com/office/drawing/2010/main" xmlns="">
                   <a:solidFill>
                     <a:srgbClr val="FFFFFF"/>
                   </a:solidFill>
                 </a14:hiddenFill>
               </a:ext>
               <a:ext uri="{91240B29-F687-4f45-9708-019B960494DF}">
-                <a14:hiddenLine xmlns="" xmlns:a14="http://schemas.microsoft.com/office/drawing/2010/main" w="12700">
+                <a14:hiddenLine xmlns:a14="http://schemas.microsoft.com/office/drawing/2010/main" xmlns="" w="12700">
                   <a:solidFill>
                     <a:srgbClr val="000000"/>
                   </a:solidFill>
@@ -20599,7 +20599,7 @@
             </a:ln>
             <a:extLst>
               <a:ext uri="{91240B29-F687-4f45-9708-019B960494DF}">
-                <a14:hiddenLine xmlns="" xmlns:a14="http://schemas.microsoft.com/office/drawing/2010/main" w="12700">
+                <a14:hiddenLine xmlns:a14="http://schemas.microsoft.com/office/drawing/2010/main" xmlns="" w="12700">
                   <a:solidFill>
                     <a:srgbClr val="000000"/>
                   </a:solidFill>
@@ -20656,14 +20656,14 @@
             </a:ln>
             <a:extLst>
               <a:ext uri="{909E8E84-426E-40dd-AFC4-6F175D3DCCD1}">
-                <a14:hiddenFill xmlns="" xmlns:a14="http://schemas.microsoft.com/office/drawing/2010/main">
+                <a14:hiddenFill xmlns:a14="http://schemas.microsoft.com/office/drawing/2010/main" xmlns="">
                   <a:solidFill>
                     <a:srgbClr val="FFFFFF"/>
                   </a:solidFill>
                 </a14:hiddenFill>
               </a:ext>
               <a:ext uri="{91240B29-F687-4f45-9708-019B960494DF}">
-                <a14:hiddenLine xmlns="" xmlns:a14="http://schemas.microsoft.com/office/drawing/2010/main" w="12700">
+                <a14:hiddenLine xmlns:a14="http://schemas.microsoft.com/office/drawing/2010/main" xmlns="" w="12700">
                   <a:solidFill>
                     <a:srgbClr val="000000"/>
                   </a:solidFill>
@@ -20720,14 +20720,14 @@
             </a:ln>
             <a:extLst>
               <a:ext uri="{909E8E84-426E-40dd-AFC4-6F175D3DCCD1}">
-                <a14:hiddenFill xmlns="" xmlns:a14="http://schemas.microsoft.com/office/drawing/2010/main">
+                <a14:hiddenFill xmlns:a14="http://schemas.microsoft.com/office/drawing/2010/main" xmlns="">
                   <a:solidFill>
                     <a:srgbClr val="FFFFFF"/>
                   </a:solidFill>
                 </a14:hiddenFill>
               </a:ext>
               <a:ext uri="{91240B29-F687-4f45-9708-019B960494DF}">
-                <a14:hiddenLine xmlns="" xmlns:a14="http://schemas.microsoft.com/office/drawing/2010/main" w="12700">
+                <a14:hiddenLine xmlns:a14="http://schemas.microsoft.com/office/drawing/2010/main" xmlns="" w="12700">
                   <a:solidFill>
                     <a:srgbClr val="000000"/>
                   </a:solidFill>
@@ -20784,14 +20784,14 @@
             </a:ln>
             <a:extLst>
               <a:ext uri="{909E8E84-426E-40dd-AFC4-6F175D3DCCD1}">
-                <a14:hiddenFill xmlns="" xmlns:a14="http://schemas.microsoft.com/office/drawing/2010/main">
+                <a14:hiddenFill xmlns:a14="http://schemas.microsoft.com/office/drawing/2010/main" xmlns="">
                   <a:solidFill>
                     <a:srgbClr val="FFFFFF"/>
                   </a:solidFill>
                 </a14:hiddenFill>
               </a:ext>
               <a:ext uri="{91240B29-F687-4f45-9708-019B960494DF}">
-                <a14:hiddenLine xmlns="" xmlns:a14="http://schemas.microsoft.com/office/drawing/2010/main" w="12700">
+                <a14:hiddenLine xmlns:a14="http://schemas.microsoft.com/office/drawing/2010/main" xmlns="" w="12700">
                   <a:solidFill>
                     <a:srgbClr val="000000"/>
                   </a:solidFill>
@@ -20850,7 +20850,7 @@
             </a:ln>
             <a:extLst>
               <a:ext uri="{91240B29-F687-4f45-9708-019B960494DF}">
-                <a14:hiddenLine xmlns="" xmlns:a14="http://schemas.microsoft.com/office/drawing/2010/main" w="12700">
+                <a14:hiddenLine xmlns:a14="http://schemas.microsoft.com/office/drawing/2010/main" xmlns="" w="12700">
                   <a:solidFill>
                     <a:srgbClr val="000000"/>
                   </a:solidFill>
@@ -20955,14 +20955,14 @@
             </a:ln>
             <a:extLst>
               <a:ext uri="{909E8E84-426E-40dd-AFC4-6F175D3DCCD1}">
-                <a14:hiddenFill xmlns="" xmlns:a14="http://schemas.microsoft.com/office/drawing/2010/main">
+                <a14:hiddenFill xmlns:a14="http://schemas.microsoft.com/office/drawing/2010/main" xmlns="">
                   <a:solidFill>
                     <a:srgbClr val="FFFFFF"/>
                   </a:solidFill>
                 </a14:hiddenFill>
               </a:ext>
               <a:ext uri="{91240B29-F687-4f45-9708-019B960494DF}">
-                <a14:hiddenLine xmlns="" xmlns:a14="http://schemas.microsoft.com/office/drawing/2010/main" w="12700">
+                <a14:hiddenLine xmlns:a14="http://schemas.microsoft.com/office/drawing/2010/main" xmlns="" w="12700">
                   <a:solidFill>
                     <a:srgbClr val="000000"/>
                   </a:solidFill>
@@ -21019,14 +21019,14 @@
             </a:ln>
             <a:extLst>
               <a:ext uri="{909E8E84-426E-40dd-AFC4-6F175D3DCCD1}">
-                <a14:hiddenFill xmlns="" xmlns:a14="http://schemas.microsoft.com/office/drawing/2010/main">
+                <a14:hiddenFill xmlns:a14="http://schemas.microsoft.com/office/drawing/2010/main" xmlns="">
                   <a:solidFill>
                     <a:srgbClr val="FFFFFF"/>
                   </a:solidFill>
                 </a14:hiddenFill>
               </a:ext>
               <a:ext uri="{91240B29-F687-4f45-9708-019B960494DF}">
-                <a14:hiddenLine xmlns="" xmlns:a14="http://schemas.microsoft.com/office/drawing/2010/main" w="12700">
+                <a14:hiddenLine xmlns:a14="http://schemas.microsoft.com/office/drawing/2010/main" xmlns="" w="12700">
                   <a:solidFill>
                     <a:srgbClr val="000000"/>
                   </a:solidFill>
@@ -21083,14 +21083,14 @@
             </a:ln>
             <a:extLst>
               <a:ext uri="{909E8E84-426E-40dd-AFC4-6F175D3DCCD1}">
-                <a14:hiddenFill xmlns="" xmlns:a14="http://schemas.microsoft.com/office/drawing/2010/main">
+                <a14:hiddenFill xmlns:a14="http://schemas.microsoft.com/office/drawing/2010/main" xmlns="">
                   <a:solidFill>
                     <a:srgbClr val="FFFFFF"/>
                   </a:solidFill>
                 </a14:hiddenFill>
               </a:ext>
               <a:ext uri="{91240B29-F687-4f45-9708-019B960494DF}">
-                <a14:hiddenLine xmlns="" xmlns:a14="http://schemas.microsoft.com/office/drawing/2010/main" w="12700">
+                <a14:hiddenLine xmlns:a14="http://schemas.microsoft.com/office/drawing/2010/main" xmlns="" w="12700">
                   <a:solidFill>
                     <a:srgbClr val="000000"/>
                   </a:solidFill>
@@ -21147,14 +21147,14 @@
             </a:ln>
             <a:extLst>
               <a:ext uri="{909E8E84-426E-40dd-AFC4-6F175D3DCCD1}">
-                <a14:hiddenFill xmlns="" xmlns:a14="http://schemas.microsoft.com/office/drawing/2010/main">
+                <a14:hiddenFill xmlns:a14="http://schemas.microsoft.com/office/drawing/2010/main" xmlns="">
                   <a:solidFill>
                     <a:srgbClr val="FFFFFF"/>
                   </a:solidFill>
                 </a14:hiddenFill>
               </a:ext>
               <a:ext uri="{91240B29-F687-4f45-9708-019B960494DF}">
-                <a14:hiddenLine xmlns="" xmlns:a14="http://schemas.microsoft.com/office/drawing/2010/main" w="12700">
+                <a14:hiddenLine xmlns:a14="http://schemas.microsoft.com/office/drawing/2010/main" xmlns="" w="12700">
                   <a:solidFill>
                     <a:srgbClr val="000000"/>
                   </a:solidFill>
@@ -21261,7 +21261,7 @@
             </a:ln>
             <a:extLst>
               <a:ext uri="{91240B29-F687-4f45-9708-019B960494DF}">
-                <a14:hiddenLine xmlns="" xmlns:a14="http://schemas.microsoft.com/office/drawing/2010/main" w="12700">
+                <a14:hiddenLine xmlns:a14="http://schemas.microsoft.com/office/drawing/2010/main" xmlns="" w="12700">
                   <a:solidFill>
                     <a:srgbClr val="000000"/>
                   </a:solidFill>
@@ -21318,14 +21318,14 @@
             </a:ln>
             <a:extLst>
               <a:ext uri="{909E8E84-426E-40dd-AFC4-6F175D3DCCD1}">
-                <a14:hiddenFill xmlns="" xmlns:a14="http://schemas.microsoft.com/office/drawing/2010/main">
+                <a14:hiddenFill xmlns:a14="http://schemas.microsoft.com/office/drawing/2010/main" xmlns="">
                   <a:solidFill>
                     <a:srgbClr val="FFFFFF"/>
                   </a:solidFill>
                 </a14:hiddenFill>
               </a:ext>
               <a:ext uri="{91240B29-F687-4f45-9708-019B960494DF}">
-                <a14:hiddenLine xmlns="" xmlns:a14="http://schemas.microsoft.com/office/drawing/2010/main" w="12700">
+                <a14:hiddenLine xmlns:a14="http://schemas.microsoft.com/office/drawing/2010/main" xmlns="" w="12700">
                   <a:solidFill>
                     <a:srgbClr val="000000"/>
                   </a:solidFill>
@@ -21384,7 +21384,7 @@
             </a:ln>
             <a:extLst>
               <a:ext uri="{91240B29-F687-4f45-9708-019B960494DF}">
-                <a14:hiddenLine xmlns="" xmlns:a14="http://schemas.microsoft.com/office/drawing/2010/main" w="12700">
+                <a14:hiddenLine xmlns:a14="http://schemas.microsoft.com/office/drawing/2010/main" xmlns="" w="12700">
                   <a:solidFill>
                     <a:srgbClr val="000000"/>
                   </a:solidFill>
@@ -21443,7 +21443,7 @@
             </a:ln>
             <a:extLst>
               <a:ext uri="{91240B29-F687-4f45-9708-019B960494DF}">
-                <a14:hiddenLine xmlns="" xmlns:a14="http://schemas.microsoft.com/office/drawing/2010/main" w="12700">
+                <a14:hiddenLine xmlns:a14="http://schemas.microsoft.com/office/drawing/2010/main" xmlns="" w="12700">
                   <a:solidFill>
                     <a:srgbClr val="000000"/>
                   </a:solidFill>
@@ -21502,7 +21502,7 @@
             </a:ln>
             <a:extLst>
               <a:ext uri="{91240B29-F687-4f45-9708-019B960494DF}">
-                <a14:hiddenLine xmlns="" xmlns:a14="http://schemas.microsoft.com/office/drawing/2010/main" w="12700">
+                <a14:hiddenLine xmlns:a14="http://schemas.microsoft.com/office/drawing/2010/main" xmlns="" w="12700">
                   <a:solidFill>
                     <a:srgbClr val="000000"/>
                   </a:solidFill>
@@ -21559,14 +21559,14 @@
             </a:ln>
             <a:extLst>
               <a:ext uri="{909E8E84-426E-40dd-AFC4-6F175D3DCCD1}">
-                <a14:hiddenFill xmlns="" xmlns:a14="http://schemas.microsoft.com/office/drawing/2010/main">
+                <a14:hiddenFill xmlns:a14="http://schemas.microsoft.com/office/drawing/2010/main" xmlns="">
                   <a:solidFill>
                     <a:srgbClr val="FFFFFF"/>
                   </a:solidFill>
                 </a14:hiddenFill>
               </a:ext>
               <a:ext uri="{91240B29-F687-4f45-9708-019B960494DF}">
-                <a14:hiddenLine xmlns="" xmlns:a14="http://schemas.microsoft.com/office/drawing/2010/main" w="12700">
+                <a14:hiddenLine xmlns:a14="http://schemas.microsoft.com/office/drawing/2010/main" xmlns="" w="12700">
                   <a:solidFill>
                     <a:srgbClr val="000000"/>
                   </a:solidFill>
@@ -21671,14 +21671,14 @@
             </a:ln>
             <a:extLst>
               <a:ext uri="{909E8E84-426E-40dd-AFC4-6F175D3DCCD1}">
-                <a14:hiddenFill xmlns="" xmlns:a14="http://schemas.microsoft.com/office/drawing/2010/main">
+                <a14:hiddenFill xmlns:a14="http://schemas.microsoft.com/office/drawing/2010/main" xmlns="">
                   <a:solidFill>
                     <a:srgbClr val="FFFFFF"/>
                   </a:solidFill>
                 </a14:hiddenFill>
               </a:ext>
               <a:ext uri="{91240B29-F687-4f45-9708-019B960494DF}">
-                <a14:hiddenLine xmlns="" xmlns:a14="http://schemas.microsoft.com/office/drawing/2010/main" w="12700">
+                <a14:hiddenLine xmlns:a14="http://schemas.microsoft.com/office/drawing/2010/main" xmlns="" w="12700">
                   <a:solidFill>
                     <a:srgbClr val="000000"/>
                   </a:solidFill>
@@ -21735,14 +21735,14 @@
             </a:ln>
             <a:extLst>
               <a:ext uri="{909E8E84-426E-40dd-AFC4-6F175D3DCCD1}">
-                <a14:hiddenFill xmlns="" xmlns:a14="http://schemas.microsoft.com/office/drawing/2010/main">
+                <a14:hiddenFill xmlns:a14="http://schemas.microsoft.com/office/drawing/2010/main" xmlns="">
                   <a:solidFill>
                     <a:srgbClr val="FFFFFF"/>
                   </a:solidFill>
                 </a14:hiddenFill>
               </a:ext>
               <a:ext uri="{91240B29-F687-4f45-9708-019B960494DF}">
-                <a14:hiddenLine xmlns="" xmlns:a14="http://schemas.microsoft.com/office/drawing/2010/main" w="12700">
+                <a14:hiddenLine xmlns:a14="http://schemas.microsoft.com/office/drawing/2010/main" xmlns="" w="12700">
                   <a:solidFill>
                     <a:srgbClr val="000000"/>
                   </a:solidFill>
@@ -21801,7 +21801,7 @@
             </a:ln>
             <a:extLst>
               <a:ext uri="{91240B29-F687-4f45-9708-019B960494DF}">
-                <a14:hiddenLine xmlns="" xmlns:a14="http://schemas.microsoft.com/office/drawing/2010/main" w="12700">
+                <a14:hiddenLine xmlns:a14="http://schemas.microsoft.com/office/drawing/2010/main" xmlns="" w="12700">
                   <a:solidFill>
                     <a:srgbClr val="000000"/>
                   </a:solidFill>
@@ -21858,14 +21858,14 @@
             </a:ln>
             <a:extLst>
               <a:ext uri="{909E8E84-426E-40dd-AFC4-6F175D3DCCD1}">
-                <a14:hiddenFill xmlns="" xmlns:a14="http://schemas.microsoft.com/office/drawing/2010/main">
+                <a14:hiddenFill xmlns:a14="http://schemas.microsoft.com/office/drawing/2010/main" xmlns="">
                   <a:solidFill>
                     <a:srgbClr val="FFFFFF"/>
                   </a:solidFill>
                 </a14:hiddenFill>
               </a:ext>
               <a:ext uri="{91240B29-F687-4f45-9708-019B960494DF}">
-                <a14:hiddenLine xmlns="" xmlns:a14="http://schemas.microsoft.com/office/drawing/2010/main" w="12700">
+                <a14:hiddenLine xmlns:a14="http://schemas.microsoft.com/office/drawing/2010/main" xmlns="" w="12700">
                   <a:solidFill>
                     <a:srgbClr val="000000"/>
                   </a:solidFill>
@@ -21924,7 +21924,7 @@
             </a:ln>
             <a:extLst>
               <a:ext uri="{91240B29-F687-4f45-9708-019B960494DF}">
-                <a14:hiddenLine xmlns="" xmlns:a14="http://schemas.microsoft.com/office/drawing/2010/main" w="12700">
+                <a14:hiddenLine xmlns:a14="http://schemas.microsoft.com/office/drawing/2010/main" xmlns="" w="12700">
                   <a:solidFill>
                     <a:srgbClr val="000000"/>
                   </a:solidFill>
@@ -21981,14 +21981,14 @@
             </a:ln>
             <a:extLst>
               <a:ext uri="{909E8E84-426E-40dd-AFC4-6F175D3DCCD1}">
-                <a14:hiddenFill xmlns="" xmlns:a14="http://schemas.microsoft.com/office/drawing/2010/main">
+                <a14:hiddenFill xmlns:a14="http://schemas.microsoft.com/office/drawing/2010/main" xmlns="">
                   <a:solidFill>
                     <a:srgbClr val="FFFFFF"/>
                   </a:solidFill>
                 </a14:hiddenFill>
               </a:ext>
               <a:ext uri="{91240B29-F687-4f45-9708-019B960494DF}">
-                <a14:hiddenLine xmlns="" xmlns:a14="http://schemas.microsoft.com/office/drawing/2010/main" w="12700">
+                <a14:hiddenLine xmlns:a14="http://schemas.microsoft.com/office/drawing/2010/main" xmlns="" w="12700">
                   <a:solidFill>
                     <a:srgbClr val="000000"/>
                   </a:solidFill>
@@ -22045,14 +22045,14 @@
             </a:ln>
             <a:extLst>
               <a:ext uri="{909E8E84-426E-40dd-AFC4-6F175D3DCCD1}">
-                <a14:hiddenFill xmlns="" xmlns:a14="http://schemas.microsoft.com/office/drawing/2010/main">
+                <a14:hiddenFill xmlns:a14="http://schemas.microsoft.com/office/drawing/2010/main" xmlns="">
                   <a:solidFill>
                     <a:srgbClr val="FFFFFF"/>
                   </a:solidFill>
                 </a14:hiddenFill>
               </a:ext>
               <a:ext uri="{91240B29-F687-4f45-9708-019B960494DF}">
-                <a14:hiddenLine xmlns="" xmlns:a14="http://schemas.microsoft.com/office/drawing/2010/main" w="12700">
+                <a14:hiddenLine xmlns:a14="http://schemas.microsoft.com/office/drawing/2010/main" xmlns="" w="12700">
                   <a:solidFill>
                     <a:srgbClr val="000000"/>
                   </a:solidFill>
@@ -22159,7 +22159,7 @@
             </a:ln>
             <a:extLst>
               <a:ext uri="{91240B29-F687-4f45-9708-019B960494DF}">
-                <a14:hiddenLine xmlns="" xmlns:a14="http://schemas.microsoft.com/office/drawing/2010/main" w="12700">
+                <a14:hiddenLine xmlns:a14="http://schemas.microsoft.com/office/drawing/2010/main" xmlns="" w="12700">
                   <a:solidFill>
                     <a:srgbClr val="000000"/>
                   </a:solidFill>
@@ -22216,14 +22216,14 @@
             </a:ln>
             <a:extLst>
               <a:ext uri="{909E8E84-426E-40dd-AFC4-6F175D3DCCD1}">
-                <a14:hiddenFill xmlns="" xmlns:a14="http://schemas.microsoft.com/office/drawing/2010/main">
+                <a14:hiddenFill xmlns:a14="http://schemas.microsoft.com/office/drawing/2010/main" xmlns="">
                   <a:solidFill>
                     <a:srgbClr val="FFFFFF"/>
                   </a:solidFill>
                 </a14:hiddenFill>
               </a:ext>
               <a:ext uri="{91240B29-F687-4f45-9708-019B960494DF}">
-                <a14:hiddenLine xmlns="" xmlns:a14="http://schemas.microsoft.com/office/drawing/2010/main" w="12700">
+                <a14:hiddenLine xmlns:a14="http://schemas.microsoft.com/office/drawing/2010/main" xmlns="" w="12700">
                   <a:solidFill>
                     <a:srgbClr val="000000"/>
                   </a:solidFill>
@@ -22282,7 +22282,7 @@
             </a:ln>
             <a:extLst>
               <a:ext uri="{91240B29-F687-4f45-9708-019B960494DF}">
-                <a14:hiddenLine xmlns="" xmlns:a14="http://schemas.microsoft.com/office/drawing/2010/main" w="12700">
+                <a14:hiddenLine xmlns:a14="http://schemas.microsoft.com/office/drawing/2010/main" xmlns="" w="12700">
                   <a:solidFill>
                     <a:srgbClr val="000000"/>
                   </a:solidFill>
@@ -22339,14 +22339,14 @@
             </a:ln>
             <a:extLst>
               <a:ext uri="{909E8E84-426E-40dd-AFC4-6F175D3DCCD1}">
-                <a14:hiddenFill xmlns="" xmlns:a14="http://schemas.microsoft.com/office/drawing/2010/main">
+                <a14:hiddenFill xmlns:a14="http://schemas.microsoft.com/office/drawing/2010/main" xmlns="">
                   <a:solidFill>
                     <a:srgbClr val="FFFFFF"/>
                   </a:solidFill>
                 </a14:hiddenFill>
               </a:ext>
               <a:ext uri="{91240B29-F687-4f45-9708-019B960494DF}">
-                <a14:hiddenLine xmlns="" xmlns:a14="http://schemas.microsoft.com/office/drawing/2010/main" w="12700">
+                <a14:hiddenLine xmlns:a14="http://schemas.microsoft.com/office/drawing/2010/main" xmlns="" w="12700">
                   <a:solidFill>
                     <a:srgbClr val="000000"/>
                   </a:solidFill>
@@ -22403,14 +22403,14 @@
             </a:ln>
             <a:extLst>
               <a:ext uri="{909E8E84-426E-40dd-AFC4-6F175D3DCCD1}">
-                <a14:hiddenFill xmlns="" xmlns:a14="http://schemas.microsoft.com/office/drawing/2010/main">
+                <a14:hiddenFill xmlns:a14="http://schemas.microsoft.com/office/drawing/2010/main" xmlns="">
                   <a:solidFill>
                     <a:srgbClr val="FFFFFF"/>
                   </a:solidFill>
                 </a14:hiddenFill>
               </a:ext>
               <a:ext uri="{91240B29-F687-4f45-9708-019B960494DF}">
-                <a14:hiddenLine xmlns="" xmlns:a14="http://schemas.microsoft.com/office/drawing/2010/main" w="12700">
+                <a14:hiddenLine xmlns:a14="http://schemas.microsoft.com/office/drawing/2010/main" xmlns="" w="12700">
                   <a:solidFill>
                     <a:srgbClr val="000000"/>
                   </a:solidFill>
@@ -22467,14 +22467,14 @@
             </a:ln>
             <a:extLst>
               <a:ext uri="{909E8E84-426E-40dd-AFC4-6F175D3DCCD1}">
-                <a14:hiddenFill xmlns="" xmlns:a14="http://schemas.microsoft.com/office/drawing/2010/main">
+                <a14:hiddenFill xmlns:a14="http://schemas.microsoft.com/office/drawing/2010/main" xmlns="">
                   <a:solidFill>
                     <a:srgbClr val="FFFFFF"/>
                   </a:solidFill>
                 </a14:hiddenFill>
               </a:ext>
               <a:ext uri="{91240B29-F687-4f45-9708-019B960494DF}">
-                <a14:hiddenLine xmlns="" xmlns:a14="http://schemas.microsoft.com/office/drawing/2010/main" w="12700">
+                <a14:hiddenLine xmlns:a14="http://schemas.microsoft.com/office/drawing/2010/main" xmlns="" w="12700">
                   <a:solidFill>
                     <a:srgbClr val="000000"/>
                   </a:solidFill>
@@ -22580,14 +22580,14 @@
           </a:ln>
           <a:extLst>
             <a:ext uri="{909E8E84-426E-40dd-AFC4-6F175D3DCCD1}">
-              <a14:hiddenFill xmlns="" xmlns:a14="http://schemas.microsoft.com/office/drawing/2010/main">
+              <a14:hiddenFill xmlns:a14="http://schemas.microsoft.com/office/drawing/2010/main" xmlns="">
                 <a:solidFill>
                   <a:srgbClr val="FFFFFF"/>
                 </a:solidFill>
               </a14:hiddenFill>
             </a:ext>
             <a:ext uri="{91240B29-F687-4f45-9708-019B960494DF}">
-              <a14:hiddenLine xmlns="" xmlns:a14="http://schemas.microsoft.com/office/drawing/2010/main" w="12700">
+              <a14:hiddenLine xmlns:a14="http://schemas.microsoft.com/office/drawing/2010/main" xmlns="" w="12700">
                 <a:solidFill>
                   <a:srgbClr val="000000"/>
                 </a:solidFill>
@@ -22765,14 +22765,14 @@
           </a:ln>
           <a:extLst>
             <a:ext uri="{909E8E84-426E-40dd-AFC4-6F175D3DCCD1}">
-              <a14:hiddenFill xmlns="" xmlns:a14="http://schemas.microsoft.com/office/drawing/2010/main">
+              <a14:hiddenFill xmlns:a14="http://schemas.microsoft.com/office/drawing/2010/main" xmlns="">
                 <a:solidFill>
                   <a:srgbClr val="FFFFFF"/>
                 </a:solidFill>
               </a14:hiddenFill>
             </a:ext>
             <a:ext uri="{91240B29-F687-4f45-9708-019B960494DF}">
-              <a14:hiddenLine xmlns="" xmlns:a14="http://schemas.microsoft.com/office/drawing/2010/main" w="12700">
+              <a14:hiddenLine xmlns:a14="http://schemas.microsoft.com/office/drawing/2010/main" xmlns="" w="12700">
                 <a:solidFill>
                   <a:srgbClr val="000000"/>
                 </a:solidFill>
@@ -22829,14 +22829,14 @@
           </a:ln>
           <a:extLst>
             <a:ext uri="{909E8E84-426E-40dd-AFC4-6F175D3DCCD1}">
-              <a14:hiddenFill xmlns="" xmlns:a14="http://schemas.microsoft.com/office/drawing/2010/main">
+              <a14:hiddenFill xmlns:a14="http://schemas.microsoft.com/office/drawing/2010/main" xmlns="">
                 <a:solidFill>
                   <a:srgbClr val="FFFFFF"/>
                 </a:solidFill>
               </a14:hiddenFill>
             </a:ext>
             <a:ext uri="{91240B29-F687-4f45-9708-019B960494DF}">
-              <a14:hiddenLine xmlns="" xmlns:a14="http://schemas.microsoft.com/office/drawing/2010/main" w="12700">
+              <a14:hiddenLine xmlns:a14="http://schemas.microsoft.com/office/drawing/2010/main" xmlns="" w="12700">
                 <a:solidFill>
                   <a:srgbClr val="000000"/>
                 </a:solidFill>
@@ -22893,14 +22893,14 @@
           </a:ln>
           <a:extLst>
             <a:ext uri="{909E8E84-426E-40dd-AFC4-6F175D3DCCD1}">
-              <a14:hiddenFill xmlns="" xmlns:a14="http://schemas.microsoft.com/office/drawing/2010/main">
+              <a14:hiddenFill xmlns:a14="http://schemas.microsoft.com/office/drawing/2010/main" xmlns="">
                 <a:solidFill>
                   <a:srgbClr val="FFFFFF"/>
                 </a:solidFill>
               </a14:hiddenFill>
             </a:ext>
             <a:ext uri="{91240B29-F687-4f45-9708-019B960494DF}">
-              <a14:hiddenLine xmlns="" xmlns:a14="http://schemas.microsoft.com/office/drawing/2010/main" w="12700">
+              <a14:hiddenLine xmlns:a14="http://schemas.microsoft.com/office/drawing/2010/main" xmlns="" w="12700">
                 <a:solidFill>
                   <a:srgbClr val="000000"/>
                 </a:solidFill>
@@ -22957,14 +22957,14 @@
           </a:ln>
           <a:extLst>
             <a:ext uri="{909E8E84-426E-40dd-AFC4-6F175D3DCCD1}">
-              <a14:hiddenFill xmlns="" xmlns:a14="http://schemas.microsoft.com/office/drawing/2010/main">
+              <a14:hiddenFill xmlns:a14="http://schemas.microsoft.com/office/drawing/2010/main" xmlns="">
                 <a:solidFill>
                   <a:srgbClr val="FFFFFF"/>
                 </a:solidFill>
               </a14:hiddenFill>
             </a:ext>
             <a:ext uri="{91240B29-F687-4f45-9708-019B960494DF}">
-              <a14:hiddenLine xmlns="" xmlns:a14="http://schemas.microsoft.com/office/drawing/2010/main" w="12700">
+              <a14:hiddenLine xmlns:a14="http://schemas.microsoft.com/office/drawing/2010/main" xmlns="" w="12700">
                 <a:solidFill>
                   <a:srgbClr val="000000"/>
                 </a:solidFill>
@@ -23021,14 +23021,14 @@
           </a:ln>
           <a:extLst>
             <a:ext uri="{909E8E84-426E-40dd-AFC4-6F175D3DCCD1}">
-              <a14:hiddenFill xmlns="" xmlns:a14="http://schemas.microsoft.com/office/drawing/2010/main">
+              <a14:hiddenFill xmlns:a14="http://schemas.microsoft.com/office/drawing/2010/main" xmlns="">
                 <a:solidFill>
                   <a:srgbClr val="FFFFFF"/>
                 </a:solidFill>
               </a14:hiddenFill>
             </a:ext>
             <a:ext uri="{91240B29-F687-4f45-9708-019B960494DF}">
-              <a14:hiddenLine xmlns="" xmlns:a14="http://schemas.microsoft.com/office/drawing/2010/main" w="12700">
+              <a14:hiddenLine xmlns:a14="http://schemas.microsoft.com/office/drawing/2010/main" xmlns="" w="12700">
                 <a:solidFill>
                   <a:srgbClr val="000000"/>
                 </a:solidFill>
@@ -23085,14 +23085,14 @@
           </a:ln>
           <a:extLst>
             <a:ext uri="{909E8E84-426E-40dd-AFC4-6F175D3DCCD1}">
-              <a14:hiddenFill xmlns="" xmlns:a14="http://schemas.microsoft.com/office/drawing/2010/main">
+              <a14:hiddenFill xmlns:a14="http://schemas.microsoft.com/office/drawing/2010/main" xmlns="">
                 <a:solidFill>
                   <a:srgbClr val="FFFFFF"/>
                 </a:solidFill>
               </a14:hiddenFill>
             </a:ext>
             <a:ext uri="{91240B29-F687-4f45-9708-019B960494DF}">
-              <a14:hiddenLine xmlns="" xmlns:a14="http://schemas.microsoft.com/office/drawing/2010/main" w="12700">
+              <a14:hiddenLine xmlns:a14="http://schemas.microsoft.com/office/drawing/2010/main" xmlns="" w="12700">
                 <a:solidFill>
                   <a:srgbClr val="000000"/>
                 </a:solidFill>
@@ -23149,14 +23149,14 @@
           </a:ln>
           <a:extLst>
             <a:ext uri="{909E8E84-426E-40dd-AFC4-6F175D3DCCD1}">
-              <a14:hiddenFill xmlns="" xmlns:a14="http://schemas.microsoft.com/office/drawing/2010/main">
+              <a14:hiddenFill xmlns:a14="http://schemas.microsoft.com/office/drawing/2010/main" xmlns="">
                 <a:solidFill>
                   <a:srgbClr val="FFFFFF"/>
                 </a:solidFill>
               </a14:hiddenFill>
             </a:ext>
             <a:ext uri="{91240B29-F687-4f45-9708-019B960494DF}">
-              <a14:hiddenLine xmlns="" xmlns:a14="http://schemas.microsoft.com/office/drawing/2010/main" w="12700">
+              <a14:hiddenLine xmlns:a14="http://schemas.microsoft.com/office/drawing/2010/main" xmlns="" w="12700">
                 <a:solidFill>
                   <a:srgbClr val="000000"/>
                 </a:solidFill>
@@ -23213,14 +23213,14 @@
           </a:ln>
           <a:extLst>
             <a:ext uri="{909E8E84-426E-40dd-AFC4-6F175D3DCCD1}">
-              <a14:hiddenFill xmlns="" xmlns:a14="http://schemas.microsoft.com/office/drawing/2010/main">
+              <a14:hiddenFill xmlns:a14="http://schemas.microsoft.com/office/drawing/2010/main" xmlns="">
                 <a:solidFill>
                   <a:srgbClr val="FFFFFF"/>
                 </a:solidFill>
               </a14:hiddenFill>
             </a:ext>
             <a:ext uri="{91240B29-F687-4f45-9708-019B960494DF}">
-              <a14:hiddenLine xmlns="" xmlns:a14="http://schemas.microsoft.com/office/drawing/2010/main" w="12700">
+              <a14:hiddenLine xmlns:a14="http://schemas.microsoft.com/office/drawing/2010/main" xmlns="" w="12700">
                 <a:solidFill>
                   <a:srgbClr val="000000"/>
                 </a:solidFill>
@@ -23277,14 +23277,14 @@
           </a:ln>
           <a:extLst>
             <a:ext uri="{909E8E84-426E-40dd-AFC4-6F175D3DCCD1}">
-              <a14:hiddenFill xmlns="" xmlns:a14="http://schemas.microsoft.com/office/drawing/2010/main">
+              <a14:hiddenFill xmlns:a14="http://schemas.microsoft.com/office/drawing/2010/main" xmlns="">
                 <a:solidFill>
                   <a:srgbClr val="FFFFFF"/>
                 </a:solidFill>
               </a14:hiddenFill>
             </a:ext>
             <a:ext uri="{91240B29-F687-4f45-9708-019B960494DF}">
-              <a14:hiddenLine xmlns="" xmlns:a14="http://schemas.microsoft.com/office/drawing/2010/main" w="12700">
+              <a14:hiddenLine xmlns:a14="http://schemas.microsoft.com/office/drawing/2010/main" xmlns="" w="12700">
                 <a:solidFill>
                   <a:srgbClr val="000000"/>
                 </a:solidFill>
@@ -23341,14 +23341,14 @@
           </a:ln>
           <a:extLst>
             <a:ext uri="{909E8E84-426E-40dd-AFC4-6F175D3DCCD1}">
-              <a14:hiddenFill xmlns="" xmlns:a14="http://schemas.microsoft.com/office/drawing/2010/main">
+              <a14:hiddenFill xmlns:a14="http://schemas.microsoft.com/office/drawing/2010/main" xmlns="">
                 <a:solidFill>
                   <a:srgbClr val="FFFFFF"/>
                 </a:solidFill>
               </a14:hiddenFill>
             </a:ext>
             <a:ext uri="{91240B29-F687-4f45-9708-019B960494DF}">
-              <a14:hiddenLine xmlns="" xmlns:a14="http://schemas.microsoft.com/office/drawing/2010/main" w="12700">
+              <a14:hiddenLine xmlns:a14="http://schemas.microsoft.com/office/drawing/2010/main" xmlns="" w="12700">
                 <a:solidFill>
                   <a:srgbClr val="000000"/>
                 </a:solidFill>
@@ -23405,14 +23405,14 @@
           </a:ln>
           <a:extLst>
             <a:ext uri="{909E8E84-426E-40dd-AFC4-6F175D3DCCD1}">
-              <a14:hiddenFill xmlns="" xmlns:a14="http://schemas.microsoft.com/office/drawing/2010/main">
+              <a14:hiddenFill xmlns:a14="http://schemas.microsoft.com/office/drawing/2010/main" xmlns="">
                 <a:solidFill>
                   <a:srgbClr val="FFFFFF"/>
                 </a:solidFill>
               </a14:hiddenFill>
             </a:ext>
             <a:ext uri="{91240B29-F687-4f45-9708-019B960494DF}">
-              <a14:hiddenLine xmlns="" xmlns:a14="http://schemas.microsoft.com/office/drawing/2010/main" w="12700">
+              <a14:hiddenLine xmlns:a14="http://schemas.microsoft.com/office/drawing/2010/main" xmlns="" w="12700">
                 <a:solidFill>
                   <a:srgbClr val="000000"/>
                 </a:solidFill>
@@ -23469,14 +23469,14 @@
           </a:ln>
           <a:extLst>
             <a:ext uri="{909E8E84-426E-40dd-AFC4-6F175D3DCCD1}">
-              <a14:hiddenFill xmlns="" xmlns:a14="http://schemas.microsoft.com/office/drawing/2010/main">
+              <a14:hiddenFill xmlns:a14="http://schemas.microsoft.com/office/drawing/2010/main" xmlns="">
                 <a:solidFill>
                   <a:srgbClr val="FFFFFF"/>
                 </a:solidFill>
               </a14:hiddenFill>
             </a:ext>
             <a:ext uri="{91240B29-F687-4f45-9708-019B960494DF}">
-              <a14:hiddenLine xmlns="" xmlns:a14="http://schemas.microsoft.com/office/drawing/2010/main" w="12700">
+              <a14:hiddenLine xmlns:a14="http://schemas.microsoft.com/office/drawing/2010/main" xmlns="" w="12700">
                 <a:solidFill>
                   <a:srgbClr val="000000"/>
                 </a:solidFill>
@@ -23535,7 +23535,7 @@
           </a:ln>
           <a:extLst>
             <a:ext uri="{91240B29-F687-4f45-9708-019B960494DF}">
-              <a14:hiddenLine xmlns="" xmlns:a14="http://schemas.microsoft.com/office/drawing/2010/main" w="12700">
+              <a14:hiddenLine xmlns:a14="http://schemas.microsoft.com/office/drawing/2010/main" xmlns="" w="12700">
                 <a:solidFill>
                   <a:srgbClr val="000000"/>
                 </a:solidFill>
@@ -23594,7 +23594,7 @@
           </a:ln>
           <a:extLst>
             <a:ext uri="{91240B29-F687-4f45-9708-019B960494DF}">
-              <a14:hiddenLine xmlns="" xmlns:a14="http://schemas.microsoft.com/office/drawing/2010/main" w="12700">
+              <a14:hiddenLine xmlns:a14="http://schemas.microsoft.com/office/drawing/2010/main" xmlns="" w="12700">
                 <a:solidFill>
                   <a:srgbClr val="000000"/>
                 </a:solidFill>
@@ -23665,14 +23665,14 @@
             </a:ln>
             <a:extLst>
               <a:ext uri="{909E8E84-426E-40dd-AFC4-6F175D3DCCD1}">
-                <a14:hiddenFill xmlns="" xmlns:a14="http://schemas.microsoft.com/office/drawing/2010/main">
+                <a14:hiddenFill xmlns:a14="http://schemas.microsoft.com/office/drawing/2010/main" xmlns="">
                   <a:solidFill>
                     <a:srgbClr val="FFFFFF"/>
                   </a:solidFill>
                 </a14:hiddenFill>
               </a:ext>
               <a:ext uri="{91240B29-F687-4f45-9708-019B960494DF}">
-                <a14:hiddenLine xmlns="" xmlns:a14="http://schemas.microsoft.com/office/drawing/2010/main" w="12700">
+                <a14:hiddenLine xmlns:a14="http://schemas.microsoft.com/office/drawing/2010/main" xmlns="" w="12700">
                   <a:solidFill>
                     <a:srgbClr val="000000"/>
                   </a:solidFill>
@@ -23729,14 +23729,14 @@
             </a:ln>
             <a:extLst>
               <a:ext uri="{909E8E84-426E-40dd-AFC4-6F175D3DCCD1}">
-                <a14:hiddenFill xmlns="" xmlns:a14="http://schemas.microsoft.com/office/drawing/2010/main">
+                <a14:hiddenFill xmlns:a14="http://schemas.microsoft.com/office/drawing/2010/main" xmlns="">
                   <a:solidFill>
                     <a:srgbClr val="FFFFFF"/>
                   </a:solidFill>
                 </a14:hiddenFill>
               </a:ext>
               <a:ext uri="{91240B29-F687-4f45-9708-019B960494DF}">
-                <a14:hiddenLine xmlns="" xmlns:a14="http://schemas.microsoft.com/office/drawing/2010/main" w="12700">
+                <a14:hiddenLine xmlns:a14="http://schemas.microsoft.com/office/drawing/2010/main" xmlns="" w="12700">
                   <a:solidFill>
                     <a:srgbClr val="000000"/>
                   </a:solidFill>
@@ -23793,14 +23793,14 @@
             </a:ln>
             <a:extLst>
               <a:ext uri="{909E8E84-426E-40dd-AFC4-6F175D3DCCD1}">
-                <a14:hiddenFill xmlns="" xmlns:a14="http://schemas.microsoft.com/office/drawing/2010/main">
+                <a14:hiddenFill xmlns:a14="http://schemas.microsoft.com/office/drawing/2010/main" xmlns="">
                   <a:solidFill>
                     <a:srgbClr val="FFFFFF"/>
                   </a:solidFill>
                 </a14:hiddenFill>
               </a:ext>
               <a:ext uri="{91240B29-F687-4f45-9708-019B960494DF}">
-                <a14:hiddenLine xmlns="" xmlns:a14="http://schemas.microsoft.com/office/drawing/2010/main" w="12700">
+                <a14:hiddenLine xmlns:a14="http://schemas.microsoft.com/office/drawing/2010/main" xmlns="" w="12700">
                   <a:solidFill>
                     <a:srgbClr val="000000"/>
                   </a:solidFill>
@@ -23857,14 +23857,14 @@
             </a:ln>
             <a:extLst>
               <a:ext uri="{909E8E84-426E-40dd-AFC4-6F175D3DCCD1}">
-                <a14:hiddenFill xmlns="" xmlns:a14="http://schemas.microsoft.com/office/drawing/2010/main">
+                <a14:hiddenFill xmlns:a14="http://schemas.microsoft.com/office/drawing/2010/main" xmlns="">
                   <a:solidFill>
                     <a:srgbClr val="FFFFFF"/>
                   </a:solidFill>
                 </a14:hiddenFill>
               </a:ext>
               <a:ext uri="{91240B29-F687-4f45-9708-019B960494DF}">
-                <a14:hiddenLine xmlns="" xmlns:a14="http://schemas.microsoft.com/office/drawing/2010/main" w="12700">
+                <a14:hiddenLine xmlns:a14="http://schemas.microsoft.com/office/drawing/2010/main" xmlns="" w="12700">
                   <a:solidFill>
                     <a:srgbClr val="000000"/>
                   </a:solidFill>
@@ -23921,14 +23921,14 @@
             </a:ln>
             <a:extLst>
               <a:ext uri="{909E8E84-426E-40dd-AFC4-6F175D3DCCD1}">
-                <a14:hiddenFill xmlns="" xmlns:a14="http://schemas.microsoft.com/office/drawing/2010/main">
+                <a14:hiddenFill xmlns:a14="http://schemas.microsoft.com/office/drawing/2010/main" xmlns="">
                   <a:solidFill>
                     <a:srgbClr val="FFFFFF"/>
                   </a:solidFill>
                 </a14:hiddenFill>
               </a:ext>
               <a:ext uri="{91240B29-F687-4f45-9708-019B960494DF}">
-                <a14:hiddenLine xmlns="" xmlns:a14="http://schemas.microsoft.com/office/drawing/2010/main" w="12700">
+                <a14:hiddenLine xmlns:a14="http://schemas.microsoft.com/office/drawing/2010/main" xmlns="" w="12700">
                   <a:solidFill>
                     <a:srgbClr val="000000"/>
                   </a:solidFill>
@@ -23990,7 +23990,7 @@
             </a:ln>
             <a:extLst>
               <a:ext uri="{909E8E84-426E-40dd-AFC4-6F175D3DCCD1}">
-                <a14:hiddenFill xmlns="" xmlns:a14="http://schemas.microsoft.com/office/drawing/2010/main">
+                <a14:hiddenFill xmlns:a14="http://schemas.microsoft.com/office/drawing/2010/main" xmlns="">
                   <a:solidFill>
                     <a:srgbClr val="FFFFFF"/>
                   </a:solidFill>
@@ -24044,14 +24044,14 @@
             </a:ln>
             <a:extLst>
               <a:ext uri="{909E8E84-426E-40dd-AFC4-6F175D3DCCD1}">
-                <a14:hiddenFill xmlns="" xmlns:a14="http://schemas.microsoft.com/office/drawing/2010/main">
+                <a14:hiddenFill xmlns:a14="http://schemas.microsoft.com/office/drawing/2010/main" xmlns="">
                   <a:solidFill>
                     <a:srgbClr val="FFFFFF"/>
                   </a:solidFill>
                 </a14:hiddenFill>
               </a:ext>
               <a:ext uri="{91240B29-F687-4f45-9708-019B960494DF}">
-                <a14:hiddenLine xmlns="" xmlns:a14="http://schemas.microsoft.com/office/drawing/2010/main" w="12700">
+                <a14:hiddenLine xmlns:a14="http://schemas.microsoft.com/office/drawing/2010/main" xmlns="" w="12700">
                   <a:solidFill>
                     <a:srgbClr val="000000"/>
                   </a:solidFill>
@@ -24110,7 +24110,7 @@
             </a:ln>
             <a:extLst>
               <a:ext uri="{91240B29-F687-4f45-9708-019B960494DF}">
-                <a14:hiddenLine xmlns="" xmlns:a14="http://schemas.microsoft.com/office/drawing/2010/main" w="12700">
+                <a14:hiddenLine xmlns:a14="http://schemas.microsoft.com/office/drawing/2010/main" xmlns="" w="12700">
                   <a:solidFill>
                     <a:srgbClr val="000000"/>
                   </a:solidFill>
@@ -24167,14 +24167,14 @@
             </a:ln>
             <a:extLst>
               <a:ext uri="{909E8E84-426E-40dd-AFC4-6F175D3DCCD1}">
-                <a14:hiddenFill xmlns="" xmlns:a14="http://schemas.microsoft.com/office/drawing/2010/main">
+                <a14:hiddenFill xmlns:a14="http://schemas.microsoft.com/office/drawing/2010/main" xmlns="">
                   <a:solidFill>
                     <a:srgbClr val="FFFFFF"/>
                   </a:solidFill>
                 </a14:hiddenFill>
               </a:ext>
               <a:ext uri="{91240B29-F687-4f45-9708-019B960494DF}">
-                <a14:hiddenLine xmlns="" xmlns:a14="http://schemas.microsoft.com/office/drawing/2010/main" w="12700">
+                <a14:hiddenLine xmlns:a14="http://schemas.microsoft.com/office/drawing/2010/main" xmlns="" w="12700">
                   <a:solidFill>
                     <a:srgbClr val="000000"/>
                   </a:solidFill>
@@ -24279,14 +24279,14 @@
             </a:ln>
             <a:extLst>
               <a:ext uri="{909E8E84-426E-40dd-AFC4-6F175D3DCCD1}">
-                <a14:hiddenFill xmlns="" xmlns:a14="http://schemas.microsoft.com/office/drawing/2010/main">
+                <a14:hiddenFill xmlns:a14="http://schemas.microsoft.com/office/drawing/2010/main" xmlns="">
                   <a:solidFill>
                     <a:srgbClr val="FFFFFF"/>
                   </a:solidFill>
                 </a14:hiddenFill>
               </a:ext>
               <a:ext uri="{91240B29-F687-4f45-9708-019B960494DF}">
-                <a14:hiddenLine xmlns="" xmlns:a14="http://schemas.microsoft.com/office/drawing/2010/main" w="12700">
+                <a14:hiddenLine xmlns:a14="http://schemas.microsoft.com/office/drawing/2010/main" xmlns="" w="12700">
                   <a:solidFill>
                     <a:srgbClr val="000000"/>
                   </a:solidFill>
@@ -24343,14 +24343,14 @@
             </a:ln>
             <a:extLst>
               <a:ext uri="{909E8E84-426E-40dd-AFC4-6F175D3DCCD1}">
-                <a14:hiddenFill xmlns="" xmlns:a14="http://schemas.microsoft.com/office/drawing/2010/main">
+                <a14:hiddenFill xmlns:a14="http://schemas.microsoft.com/office/drawing/2010/main" xmlns="">
                   <a:solidFill>
                     <a:srgbClr val="FFFFFF"/>
                   </a:solidFill>
                 </a14:hiddenFill>
               </a:ext>
               <a:ext uri="{91240B29-F687-4f45-9708-019B960494DF}">
-                <a14:hiddenLine xmlns="" xmlns:a14="http://schemas.microsoft.com/office/drawing/2010/main" w="12700">
+                <a14:hiddenLine xmlns:a14="http://schemas.microsoft.com/office/drawing/2010/main" xmlns="" w="12700">
                   <a:solidFill>
                     <a:srgbClr val="000000"/>
                   </a:solidFill>
@@ -24455,14 +24455,14 @@
             </a:ln>
             <a:extLst>
               <a:ext uri="{909E8E84-426E-40dd-AFC4-6F175D3DCCD1}">
-                <a14:hiddenFill xmlns="" xmlns:a14="http://schemas.microsoft.com/office/drawing/2010/main">
+                <a14:hiddenFill xmlns:a14="http://schemas.microsoft.com/office/drawing/2010/main" xmlns="">
                   <a:solidFill>
                     <a:srgbClr val="FFFFFF"/>
                   </a:solidFill>
                 </a14:hiddenFill>
               </a:ext>
               <a:ext uri="{91240B29-F687-4f45-9708-019B960494DF}">
-                <a14:hiddenLine xmlns="" xmlns:a14="http://schemas.microsoft.com/office/drawing/2010/main" w="12700">
+                <a14:hiddenLine xmlns:a14="http://schemas.microsoft.com/office/drawing/2010/main" xmlns="" w="12700">
                   <a:solidFill>
                     <a:srgbClr val="000000"/>
                   </a:solidFill>
@@ -24521,7 +24521,7 @@
             </a:ln>
             <a:extLst>
               <a:ext uri="{91240B29-F687-4f45-9708-019B960494DF}">
-                <a14:hiddenLine xmlns="" xmlns:a14="http://schemas.microsoft.com/office/drawing/2010/main" w="12700">
+                <a14:hiddenLine xmlns:a14="http://schemas.microsoft.com/office/drawing/2010/main" xmlns="" w="12700">
                   <a:solidFill>
                     <a:srgbClr val="000000"/>
                   </a:solidFill>
@@ -24628,7 +24628,7 @@
             </a:ln>
             <a:extLst>
               <a:ext uri="{91240B29-F687-4f45-9708-019B960494DF}">
-                <a14:hiddenLine xmlns="" xmlns:a14="http://schemas.microsoft.com/office/drawing/2010/main" w="12700">
+                <a14:hiddenLine xmlns:a14="http://schemas.microsoft.com/office/drawing/2010/main" xmlns="" w="12700">
                   <a:solidFill>
                     <a:srgbClr val="000000"/>
                   </a:solidFill>
@@ -24687,7 +24687,7 @@
             </a:ln>
             <a:extLst>
               <a:ext uri="{91240B29-F687-4f45-9708-019B960494DF}">
-                <a14:hiddenLine xmlns="" xmlns:a14="http://schemas.microsoft.com/office/drawing/2010/main" w="12700">
+                <a14:hiddenLine xmlns:a14="http://schemas.microsoft.com/office/drawing/2010/main" xmlns="" w="12700">
                   <a:solidFill>
                     <a:srgbClr val="000000"/>
                   </a:solidFill>
@@ -24746,7 +24746,7 @@
             </a:ln>
             <a:extLst>
               <a:ext uri="{91240B29-F687-4f45-9708-019B960494DF}">
-                <a14:hiddenLine xmlns="" xmlns:a14="http://schemas.microsoft.com/office/drawing/2010/main" w="12700">
+                <a14:hiddenLine xmlns:a14="http://schemas.microsoft.com/office/drawing/2010/main" xmlns="" w="12700">
                   <a:solidFill>
                     <a:srgbClr val="000000"/>
                   </a:solidFill>
@@ -27411,7 +27411,7 @@
                         <m:sSubPr>
                           <m:ctrlPr>
                             <a:rPr lang="en-US" sz="2800" b="1" i="1" smtClean="0">
-                              <a:latin typeface="Cambria Math" panose="02040503050406030204" pitchFamily="18" charset="0"/>
+                              <a:latin typeface="Cambria Math" charset="0"/>
                             </a:rPr>
                           </m:ctrlPr>
                         </m:sSubPr>
@@ -27497,7 +27497,7 @@
                           <m:endChr m:val="⟩"/>
                           <m:ctrlPr>
                             <a:rPr lang="en-US" sz="2800" b="0" i="1" smtClean="0">
-                              <a:latin typeface="Cambria Math" panose="02040503050406030204" pitchFamily="18" charset="0"/>
+                              <a:latin typeface="Cambria Math" charset="0"/>
                               <a:ea typeface="Cambria Math" panose="02040503050406030204" pitchFamily="18" charset="0"/>
                             </a:rPr>
                           </m:ctrlPr>
@@ -28396,7 +28396,7 @@
                           <m:endChr m:val="⟩"/>
                           <m:ctrlPr>
                             <a:rPr lang="en-US" sz="3200" b="0" i="1" smtClean="0">
-                              <a:latin typeface="Cambria Math" panose="02040503050406030204" pitchFamily="18" charset="0"/>
+                              <a:latin typeface="Cambria Math" charset="0"/>
                             </a:rPr>
                           </m:ctrlPr>
                         </m:dPr>
@@ -28451,7 +28451,7 @@
                         <m:sSupPr>
                           <m:ctrlPr>
                             <a:rPr lang="en-US" sz="3200" b="0" i="1" smtClean="0">
-                              <a:latin typeface="Cambria Math" panose="02040503050406030204" pitchFamily="18" charset="0"/>
+                              <a:latin typeface="Cambria Math" charset="0"/>
                               <a:ea typeface="Cambria Math" panose="02040503050406030204" pitchFamily="18" charset="0"/>
                             </a:rPr>
                           </m:ctrlPr>
@@ -28489,7 +28489,7 @@
                         <m:sSupPr>
                           <m:ctrlPr>
                             <a:rPr lang="en-US" sz="3200" b="0" i="1" smtClean="0">
-                              <a:latin typeface="Cambria Math" panose="02040503050406030204" pitchFamily="18" charset="0"/>
+                              <a:latin typeface="Cambria Math" charset="0"/>
                               <a:ea typeface="Cambria Math" panose="02040503050406030204" pitchFamily="18" charset="0"/>
                             </a:rPr>
                           </m:ctrlPr>

</xml_diff>